<commit_message>
add ppt and data
</commit_message>
<xml_diff>
--- a/capstone.pptx
+++ b/capstone.pptx
@@ -1955,7 +1955,7 @@
           <a:bodyPr lIns="0" rIns="0" tIns="0" bIns="0"/>
           <a:p>
             <a:pPr algn="r"/>
-            <a:fld id="{14226B16-1A02-40BC-A7AE-F370978B9CEA}" type="slidenum">
+            <a:fld id="{000FBE10-A4A4-4175-9652-67949B680DC7}" type="slidenum">
               <a:rPr b="0" lang="en-US" sz="1400" spc="-1" strike="noStrike">
                 <a:solidFill>
                   <a:srgbClr val="000000"/>
@@ -2863,7 +2863,7 @@
                 </a:uFill>
                 <a:latin typeface="Arial"/>
               </a:rPr>
-              <a:t>Use case 2: Crop disease forecasting </a:t>
+              <a:t>Use case 2: Crop disease forecasting  </a:t>
             </a:r>
             <a:endParaRPr b="0" lang="en-US" sz="2600" spc="-1" strike="noStrike">
               <a:solidFill>
@@ -2898,7 +2898,7 @@
                 </a:uFill>
                 <a:latin typeface="Arial"/>
               </a:rPr>
-              <a:t>Given a location, a plant type in a farm, we can forecast the arrival/spread of certain disease given weather information. </a:t>
+              <a:t>Combine crops, leaf wellness data with weather-based models</a:t>
             </a:r>
             <a:endParaRPr b="0" lang="en-US" sz="2800" spc="-1" strike="noStrike">
               <a:solidFill>
@@ -2933,9 +2933,114 @@
                 </a:uFill>
                 <a:latin typeface="Arial"/>
               </a:rPr>
-              <a:t>Farmers can take measures ahead of time to prevent disease, improve crop management, and increase yield. </a:t>
+              <a:t>Given a location, a plant type in a farm, we can forecast the arrival/spread of certain disease given weather information. </a:t>
             </a:r>
             <a:endParaRPr b="0" lang="en-US" sz="2800" spc="-1" strike="noStrike">
+              <a:solidFill>
+                <a:srgbClr val="000000"/>
+              </a:solidFill>
+              <a:uFill>
+                <a:solidFill>
+                  <a:srgbClr val="ffffff"/>
+                </a:solidFill>
+              </a:uFill>
+              <a:latin typeface="Arial"/>
+            </a:endParaRPr>
+          </a:p>
+          <a:p>
+            <a:pPr lvl="2" marL="1296000" indent="-288000">
+              <a:buClr>
+                <a:srgbClr val="000000"/>
+              </a:buClr>
+              <a:buSzPct val="45000"/>
+              <a:buFont typeface="Wingdings" charset="2"/>
+              <a:buChar char=""/>
+            </a:pPr>
+            <a:r>
+              <a:rPr b="0" lang="en-US" sz="2400" spc="-1" strike="noStrike">
+                <a:solidFill>
+                  <a:srgbClr val="000000"/>
+                </a:solidFill>
+                <a:uFill>
+                  <a:solidFill>
+                    <a:srgbClr val="ffffff"/>
+                  </a:solidFill>
+                </a:uFill>
+                <a:latin typeface="Arial"/>
+              </a:rPr>
+              <a:t>predicted disease incidence or severity </a:t>
+            </a:r>
+            <a:endParaRPr b="0" lang="en-US" sz="2400" spc="-1" strike="noStrike">
+              <a:solidFill>
+                <a:srgbClr val="000000"/>
+              </a:solidFill>
+              <a:uFill>
+                <a:solidFill>
+                  <a:srgbClr val="ffffff"/>
+                </a:solidFill>
+              </a:uFill>
+              <a:latin typeface="Arial"/>
+            </a:endParaRPr>
+          </a:p>
+          <a:p>
+            <a:pPr lvl="2" marL="1296000" indent="-288000">
+              <a:buClr>
+                <a:srgbClr val="000000"/>
+              </a:buClr>
+              <a:buSzPct val="45000"/>
+              <a:buFont typeface="Wingdings" charset="2"/>
+              <a:buChar char=""/>
+            </a:pPr>
+            <a:r>
+              <a:rPr b="0" lang="en-US" sz="2400" spc="-1" strike="noStrike">
+                <a:solidFill>
+                  <a:srgbClr val="000000"/>
+                </a:solidFill>
+                <a:uFill>
+                  <a:solidFill>
+                    <a:srgbClr val="ffffff"/>
+                  </a:solidFill>
+                </a:uFill>
+                <a:latin typeface="Arial"/>
+              </a:rPr>
+              <a:t>predicted timing of fungicide dvelopment/ inoculum development.</a:t>
+            </a:r>
+            <a:endParaRPr b="0" lang="en-US" sz="2400" spc="-1" strike="noStrike">
+              <a:solidFill>
+                <a:srgbClr val="000000"/>
+              </a:solidFill>
+              <a:uFill>
+                <a:solidFill>
+                  <a:srgbClr val="ffffff"/>
+                </a:solidFill>
+              </a:uFill>
+              <a:latin typeface="Arial"/>
+            </a:endParaRPr>
+          </a:p>
+          <a:p>
+            <a:pPr lvl="2" marL="1296000" indent="-288000">
+              <a:buClr>
+                <a:srgbClr val="000000"/>
+              </a:buClr>
+              <a:buSzPct val="45000"/>
+              <a:buFont typeface="Wingdings" charset="2"/>
+              <a:buChar char=""/>
+            </a:pPr>
+            <a:r>
+              <a:rPr b="0" lang="en-US" sz="2400" spc="-1" strike="noStrike">
+                <a:solidFill>
+                  <a:srgbClr val="000000"/>
+                </a:solidFill>
+                <a:uFill>
+                  <a:solidFill>
+                    <a:srgbClr val="ffffff"/>
+                  </a:solidFill>
+                </a:uFill>
+                <a:latin typeface="Arial"/>
+              </a:rPr>
+              <a:t>growers, crop consultants, and other agricultural professionals can use the model to prevent disease, improve crop management, and increase yield. </a:t>
+            </a:r>
+            <a:endParaRPr b="0" lang="en-US" sz="2400" spc="-1" strike="noStrike">
               <a:solidFill>
                 <a:srgbClr val="000000"/>
               </a:solidFill>
@@ -3231,7 +3336,21 @@
                 </a:uFill>
                 <a:latin typeface="Arial"/>
               </a:rPr>
-              <a:t>Crop common name,Crop scientific name,Disease common name,Disease scientific name,url,description,metadata</a:t>
+              <a:t>Crop common name,Crop scientific name,Disease common </a:t>
+            </a:r>
+            <a:r>
+              <a:rPr b="0" lang="en-US" sz="2000" spc="-1" strike="noStrike">
+                <a:solidFill>
+                  <a:srgbClr val="000000"/>
+                </a:solidFill>
+                <a:uFill>
+                  <a:solidFill>
+                    <a:srgbClr val="ffffff"/>
+                  </a:solidFill>
+                </a:uFill>
+                <a:latin typeface="Arial"/>
+              </a:rPr>
+              <a:t>name,Disease scientific name,url,description,metadata</a:t>
             </a:r>
             <a:endParaRPr b="0" lang="en-US" sz="2000" spc="-1" strike="noStrike">
               <a:solidFill>

</xml_diff>